<commit_message>
comparing garlic vs non garlic samples in slides
</commit_message>
<xml_diff>
--- a/Carcharnid_Analysis_Presentation.pptx
+++ b/Carcharnid_Analysis_Presentation.pptx
@@ -11,7 +11,8 @@
     <p:sldId id="260" r:id="rId5"/>
     <p:sldId id="262" r:id="rId6"/>
     <p:sldId id="261" r:id="rId7"/>
-    <p:sldId id="263" r:id="rId8"/>
+    <p:sldId id="264" r:id="rId8"/>
+    <p:sldId id="263" r:id="rId9"/>
   </p:sldIdLst>
   <p:sldSz cx="12192000" cy="6858000"/>
   <p:notesSz cx="6858000" cy="9144000"/>
@@ -9035,6 +9036,676 @@
       </p:grpSpPr>
       <p:sp>
         <p:nvSpPr>
+          <p:cNvPr id="2" name="Title 1">
+            <a:extLst>
+              <a:ext uri="{FF2B5EF4-FFF2-40B4-BE49-F238E27FC236}">
+                <a16:creationId xmlns:a16="http://schemas.microsoft.com/office/drawing/2014/main" id="{7CF105C9-6CBD-4BEB-A1D1-F3C104E8FBF8}"/>
+              </a:ext>
+            </a:extLst>
+          </p:cNvPr>
+          <p:cNvSpPr>
+            <a:spLocks noGrp="1"/>
+          </p:cNvSpPr>
+          <p:nvPr>
+            <p:ph type="title"/>
+          </p:nvPr>
+        </p:nvSpPr>
+        <p:spPr/>
+        <p:txBody>
+          <a:bodyPr/>
+          <a:lstStyle/>
+          <a:p>
+            <a:r>
+              <a:rPr lang="en-US" dirty="0"/>
+              <a:t>Comparison of garlic vs non-garlic food combos</a:t>
+            </a:r>
+          </a:p>
+        </p:txBody>
+      </p:sp>
+      <p:graphicFrame>
+        <p:nvGraphicFramePr>
+          <p:cNvPr id="3" name="Table 3">
+            <a:extLst>
+              <a:ext uri="{FF2B5EF4-FFF2-40B4-BE49-F238E27FC236}">
+                <a16:creationId xmlns:a16="http://schemas.microsoft.com/office/drawing/2014/main" id="{558BA89E-39DE-4F85-9775-1524F2752D2A}"/>
+              </a:ext>
+            </a:extLst>
+          </p:cNvPr>
+          <p:cNvGraphicFramePr>
+            <a:graphicFrameLocks noGrp="1"/>
+          </p:cNvGraphicFramePr>
+          <p:nvPr>
+            <p:extLst>
+              <p:ext uri="{D42A27DB-BD31-4B8C-83A1-F6EECF244321}">
+                <p14:modId xmlns:p14="http://schemas.microsoft.com/office/powerpoint/2010/main" val="3914234877"/>
+              </p:ext>
+            </p:extLst>
+          </p:nvPr>
+        </p:nvGraphicFramePr>
+        <p:xfrm>
+          <a:off x="1608488" y="2355961"/>
+          <a:ext cx="7940951" cy="3337560"/>
+        </p:xfrm>
+        <a:graphic>
+          <a:graphicData uri="http://schemas.openxmlformats.org/drawingml/2006/table">
+            <a:tbl>
+              <a:tblPr firstRow="1" bandRow="1">
+                <a:tableStyleId>{5FD0F851-EC5A-4D38-B0AD-8093EC10F338}</a:tableStyleId>
+              </a:tblPr>
+              <a:tblGrid>
+                <a:gridCol w="3280200">
+                  <a:extLst>
+                    <a:ext uri="{9D8B030D-6E8A-4147-A177-3AD203B41FA5}">
+                      <a16:colId xmlns:a16="http://schemas.microsoft.com/office/drawing/2014/main" val="1465954410"/>
+                    </a:ext>
+                  </a:extLst>
+                </a:gridCol>
+                <a:gridCol w="978869">
+                  <a:extLst>
+                    <a:ext uri="{9D8B030D-6E8A-4147-A177-3AD203B41FA5}">
+                      <a16:colId xmlns:a16="http://schemas.microsoft.com/office/drawing/2014/main" val="3920165140"/>
+                    </a:ext>
+                  </a:extLst>
+                </a:gridCol>
+                <a:gridCol w="1857626">
+                  <a:extLst>
+                    <a:ext uri="{9D8B030D-6E8A-4147-A177-3AD203B41FA5}">
+                      <a16:colId xmlns:a16="http://schemas.microsoft.com/office/drawing/2014/main" val="4090444763"/>
+                    </a:ext>
+                  </a:extLst>
+                </a:gridCol>
+                <a:gridCol w="1824256">
+                  <a:extLst>
+                    <a:ext uri="{9D8B030D-6E8A-4147-A177-3AD203B41FA5}">
+                      <a16:colId xmlns:a16="http://schemas.microsoft.com/office/drawing/2014/main" val="3412661515"/>
+                    </a:ext>
+                  </a:extLst>
+                </a:gridCol>
+              </a:tblGrid>
+              <a:tr h="370840">
+                <a:tc>
+                  <a:txBody>
+                    <a:bodyPr/>
+                    <a:lstStyle/>
+                    <a:p>
+                      <a:r>
+                        <a:rPr lang="en-US" dirty="0"/>
+                        <a:t>Food Combo</a:t>
+                      </a:r>
+                    </a:p>
+                  </a:txBody>
+                  <a:tcPr/>
+                </a:tc>
+                <a:tc>
+                  <a:txBody>
+                    <a:bodyPr/>
+                    <a:lstStyle/>
+                    <a:p>
+                      <a:r>
+                        <a:rPr lang="en-US" dirty="0"/>
+                        <a:t>Count</a:t>
+                      </a:r>
+                    </a:p>
+                  </a:txBody>
+                  <a:tcPr/>
+                </a:tc>
+                <a:tc>
+                  <a:txBody>
+                    <a:bodyPr/>
+                    <a:lstStyle/>
+                    <a:p>
+                      <a:r>
+                        <a:rPr lang="en-US" dirty="0" err="1"/>
+                        <a:t>Average_eat</a:t>
+                      </a:r>
+                      <a:endParaRPr lang="en-US" dirty="0"/>
+                    </a:p>
+                  </a:txBody>
+                  <a:tcPr/>
+                </a:tc>
+                <a:tc>
+                  <a:txBody>
+                    <a:bodyPr/>
+                    <a:lstStyle/>
+                    <a:p>
+                      <a:r>
+                        <a:rPr lang="en-US" dirty="0" err="1"/>
+                        <a:t>Eat_target_pct</a:t>
+                      </a:r>
+                      <a:endParaRPr lang="en-US" dirty="0"/>
+                    </a:p>
+                  </a:txBody>
+                  <a:tcPr/>
+                </a:tc>
+                <a:extLst>
+                  <a:ext uri="{0D108BD9-81ED-4DB2-BD59-A6C34878D82A}">
+                    <a16:rowId xmlns:a16="http://schemas.microsoft.com/office/drawing/2014/main" val="445434594"/>
+                  </a:ext>
+                </a:extLst>
+              </a:tr>
+              <a:tr h="370840">
+                <a:tc>
+                  <a:txBody>
+                    <a:bodyPr/>
+                    <a:lstStyle/>
+                    <a:p>
+                      <a:r>
+                        <a:rPr lang="en-US" dirty="0" err="1"/>
+                        <a:t>Mackerel_Garlic</a:t>
+                      </a:r>
+                      <a:endParaRPr lang="en-US" dirty="0"/>
+                    </a:p>
+                  </a:txBody>
+                  <a:tcPr/>
+                </a:tc>
+                <a:tc>
+                  <a:txBody>
+                    <a:bodyPr/>
+                    <a:lstStyle/>
+                    <a:p>
+                      <a:r>
+                        <a:rPr lang="en-US" dirty="0"/>
+                        <a:t>108</a:t>
+                      </a:r>
+                    </a:p>
+                  </a:txBody>
+                  <a:tcPr/>
+                </a:tc>
+                <a:tc>
+                  <a:txBody>
+                    <a:bodyPr/>
+                    <a:lstStyle/>
+                    <a:p>
+                      <a:r>
+                        <a:rPr lang="en-US" dirty="0"/>
+                        <a:t>19.4</a:t>
+                      </a:r>
+                    </a:p>
+                  </a:txBody>
+                  <a:tcPr/>
+                </a:tc>
+                <a:tc>
+                  <a:txBody>
+                    <a:bodyPr/>
+                    <a:lstStyle/>
+                    <a:p>
+                      <a:r>
+                        <a:rPr lang="en-US" dirty="0"/>
+                        <a:t>0.32</a:t>
+                      </a:r>
+                    </a:p>
+                  </a:txBody>
+                  <a:tcPr/>
+                </a:tc>
+                <a:extLst>
+                  <a:ext uri="{0D108BD9-81ED-4DB2-BD59-A6C34878D82A}">
+                    <a16:rowId xmlns:a16="http://schemas.microsoft.com/office/drawing/2014/main" val="3417214370"/>
+                  </a:ext>
+                </a:extLst>
+              </a:tr>
+              <a:tr h="370840">
+                <a:tc>
+                  <a:txBody>
+                    <a:bodyPr/>
+                    <a:lstStyle/>
+                    <a:p>
+                      <a:r>
+                        <a:rPr lang="en-US" dirty="0"/>
+                        <a:t>Mackerel</a:t>
+                      </a:r>
+                    </a:p>
+                  </a:txBody>
+                  <a:tcPr/>
+                </a:tc>
+                <a:tc>
+                  <a:txBody>
+                    <a:bodyPr/>
+                    <a:lstStyle/>
+                    <a:p>
+                      <a:r>
+                        <a:rPr lang="en-US" dirty="0"/>
+                        <a:t>36</a:t>
+                      </a:r>
+                    </a:p>
+                  </a:txBody>
+                  <a:tcPr/>
+                </a:tc>
+                <a:tc>
+                  <a:txBody>
+                    <a:bodyPr/>
+                    <a:lstStyle/>
+                    <a:p>
+                      <a:r>
+                        <a:rPr lang="en-US" dirty="0"/>
+                        <a:t>18.2</a:t>
+                      </a:r>
+                    </a:p>
+                  </a:txBody>
+                  <a:tcPr/>
+                </a:tc>
+                <a:tc>
+                  <a:txBody>
+                    <a:bodyPr/>
+                    <a:lstStyle/>
+                    <a:p>
+                      <a:r>
+                        <a:rPr lang="en-US" dirty="0"/>
+                        <a:t>0.30</a:t>
+                      </a:r>
+                    </a:p>
+                  </a:txBody>
+                  <a:tcPr/>
+                </a:tc>
+                <a:extLst>
+                  <a:ext uri="{0D108BD9-81ED-4DB2-BD59-A6C34878D82A}">
+                    <a16:rowId xmlns:a16="http://schemas.microsoft.com/office/drawing/2014/main" val="2352010419"/>
+                  </a:ext>
+                </a:extLst>
+              </a:tr>
+              <a:tr h="370840">
+                <a:tc>
+                  <a:txBody>
+                    <a:bodyPr/>
+                    <a:lstStyle/>
+                    <a:p>
+                      <a:r>
+                        <a:rPr lang="en-US" dirty="0" err="1"/>
+                        <a:t>Herring_Garlic</a:t>
+                      </a:r>
+                      <a:endParaRPr lang="en-US" dirty="0"/>
+                    </a:p>
+                  </a:txBody>
+                  <a:tcPr/>
+                </a:tc>
+                <a:tc>
+                  <a:txBody>
+                    <a:bodyPr/>
+                    <a:lstStyle/>
+                    <a:p>
+                      <a:r>
+                        <a:rPr lang="en-US" dirty="0"/>
+                        <a:t>33</a:t>
+                      </a:r>
+                    </a:p>
+                  </a:txBody>
+                  <a:tcPr/>
+                </a:tc>
+                <a:tc>
+                  <a:txBody>
+                    <a:bodyPr/>
+                    <a:lstStyle/>
+                    <a:p>
+                      <a:r>
+                        <a:rPr lang="en-US" dirty="0"/>
+                        <a:t>12.2</a:t>
+                      </a:r>
+                    </a:p>
+                  </a:txBody>
+                  <a:tcPr/>
+                </a:tc>
+                <a:tc>
+                  <a:txBody>
+                    <a:bodyPr/>
+                    <a:lstStyle/>
+                    <a:p>
+                      <a:r>
+                        <a:rPr lang="en-US" dirty="0"/>
+                        <a:t>0.36</a:t>
+                      </a:r>
+                    </a:p>
+                  </a:txBody>
+                  <a:tcPr/>
+                </a:tc>
+                <a:extLst>
+                  <a:ext uri="{0D108BD9-81ED-4DB2-BD59-A6C34878D82A}">
+                    <a16:rowId xmlns:a16="http://schemas.microsoft.com/office/drawing/2014/main" val="1272334728"/>
+                  </a:ext>
+                </a:extLst>
+              </a:tr>
+              <a:tr h="370840">
+                <a:tc>
+                  <a:txBody>
+                    <a:bodyPr/>
+                    <a:lstStyle/>
+                    <a:p>
+                      <a:r>
+                        <a:rPr lang="en-US" dirty="0"/>
+                        <a:t>Herring</a:t>
+                      </a:r>
+                    </a:p>
+                  </a:txBody>
+                  <a:tcPr/>
+                </a:tc>
+                <a:tc>
+                  <a:txBody>
+                    <a:bodyPr/>
+                    <a:lstStyle/>
+                    <a:p>
+                      <a:r>
+                        <a:rPr lang="en-US" dirty="0"/>
+                        <a:t>89</a:t>
+                      </a:r>
+                    </a:p>
+                  </a:txBody>
+                  <a:tcPr/>
+                </a:tc>
+                <a:tc>
+                  <a:txBody>
+                    <a:bodyPr/>
+                    <a:lstStyle/>
+                    <a:p>
+                      <a:r>
+                        <a:rPr lang="en-US" dirty="0"/>
+                        <a:t>11.4</a:t>
+                      </a:r>
+                    </a:p>
+                  </a:txBody>
+                  <a:tcPr/>
+                </a:tc>
+                <a:tc>
+                  <a:txBody>
+                    <a:bodyPr/>
+                    <a:lstStyle/>
+                    <a:p>
+                      <a:r>
+                        <a:rPr lang="en-US" dirty="0"/>
+                        <a:t>0.48</a:t>
+                      </a:r>
+                    </a:p>
+                  </a:txBody>
+                  <a:tcPr/>
+                </a:tc>
+                <a:extLst>
+                  <a:ext uri="{0D108BD9-81ED-4DB2-BD59-A6C34878D82A}">
+                    <a16:rowId xmlns:a16="http://schemas.microsoft.com/office/drawing/2014/main" val="1002709184"/>
+                  </a:ext>
+                </a:extLst>
+              </a:tr>
+              <a:tr h="370840">
+                <a:tc>
+                  <a:txBody>
+                    <a:bodyPr/>
+                    <a:lstStyle/>
+                    <a:p>
+                      <a:r>
+                        <a:rPr lang="en-US" dirty="0"/>
+                        <a:t>Saury Garlic</a:t>
+                      </a:r>
+                    </a:p>
+                  </a:txBody>
+                  <a:tcPr/>
+                </a:tc>
+                <a:tc>
+                  <a:txBody>
+                    <a:bodyPr/>
+                    <a:lstStyle/>
+                    <a:p>
+                      <a:r>
+                        <a:rPr lang="en-US" dirty="0"/>
+                        <a:t>103</a:t>
+                      </a:r>
+                    </a:p>
+                  </a:txBody>
+                  <a:tcPr/>
+                </a:tc>
+                <a:tc>
+                  <a:txBody>
+                    <a:bodyPr/>
+                    <a:lstStyle/>
+                    <a:p>
+                      <a:r>
+                        <a:rPr lang="en-US" dirty="0"/>
+                        <a:t>27.1</a:t>
+                      </a:r>
+                    </a:p>
+                  </a:txBody>
+                  <a:tcPr/>
+                </a:tc>
+                <a:tc>
+                  <a:txBody>
+                    <a:bodyPr/>
+                    <a:lstStyle/>
+                    <a:p>
+                      <a:r>
+                        <a:rPr lang="en-US" dirty="0"/>
+                        <a:t>0.41</a:t>
+                      </a:r>
+                    </a:p>
+                  </a:txBody>
+                  <a:tcPr/>
+                </a:tc>
+                <a:extLst>
+                  <a:ext uri="{0D108BD9-81ED-4DB2-BD59-A6C34878D82A}">
+                    <a16:rowId xmlns:a16="http://schemas.microsoft.com/office/drawing/2014/main" val="1449434295"/>
+                  </a:ext>
+                </a:extLst>
+              </a:tr>
+              <a:tr h="370840">
+                <a:tc>
+                  <a:txBody>
+                    <a:bodyPr/>
+                    <a:lstStyle/>
+                    <a:p>
+                      <a:r>
+                        <a:rPr lang="en-US" dirty="0"/>
+                        <a:t>Saury</a:t>
+                      </a:r>
+                    </a:p>
+                  </a:txBody>
+                  <a:tcPr/>
+                </a:tc>
+                <a:tc>
+                  <a:txBody>
+                    <a:bodyPr/>
+                    <a:lstStyle/>
+                    <a:p>
+                      <a:r>
+                        <a:rPr lang="en-US" dirty="0"/>
+                        <a:t>16</a:t>
+                      </a:r>
+                    </a:p>
+                  </a:txBody>
+                  <a:tcPr/>
+                </a:tc>
+                <a:tc>
+                  <a:txBody>
+                    <a:bodyPr/>
+                    <a:lstStyle/>
+                    <a:p>
+                      <a:r>
+                        <a:rPr lang="en-US" dirty="0"/>
+                        <a:t>24.1</a:t>
+                      </a:r>
+                    </a:p>
+                  </a:txBody>
+                  <a:tcPr/>
+                </a:tc>
+                <a:tc>
+                  <a:txBody>
+                    <a:bodyPr/>
+                    <a:lstStyle/>
+                    <a:p>
+                      <a:r>
+                        <a:rPr lang="en-US" dirty="0"/>
+                        <a:t>0.35</a:t>
+                      </a:r>
+                    </a:p>
+                  </a:txBody>
+                  <a:tcPr/>
+                </a:tc>
+                <a:extLst>
+                  <a:ext uri="{0D108BD9-81ED-4DB2-BD59-A6C34878D82A}">
+                    <a16:rowId xmlns:a16="http://schemas.microsoft.com/office/drawing/2014/main" val="1522514902"/>
+                  </a:ext>
+                </a:extLst>
+              </a:tr>
+              <a:tr h="370840">
+                <a:tc>
+                  <a:txBody>
+                    <a:bodyPr/>
+                    <a:lstStyle/>
+                    <a:p>
+                      <a:r>
+                        <a:rPr lang="en-US" dirty="0"/>
+                        <a:t>Blue </a:t>
+                      </a:r>
+                      <a:r>
+                        <a:rPr lang="en-US" dirty="0" err="1"/>
+                        <a:t>Runner_Squid</a:t>
+                      </a:r>
+                      <a:r>
+                        <a:rPr lang="en-US" dirty="0"/>
+                        <a:t> Garlic</a:t>
+                      </a:r>
+                    </a:p>
+                  </a:txBody>
+                  <a:tcPr/>
+                </a:tc>
+                <a:tc>
+                  <a:txBody>
+                    <a:bodyPr/>
+                    <a:lstStyle/>
+                    <a:p>
+                      <a:r>
+                        <a:rPr lang="en-US" dirty="0"/>
+                        <a:t>67</a:t>
+                      </a:r>
+                    </a:p>
+                  </a:txBody>
+                  <a:tcPr/>
+                </a:tc>
+                <a:tc>
+                  <a:txBody>
+                    <a:bodyPr/>
+                    <a:lstStyle/>
+                    <a:p>
+                      <a:r>
+                        <a:rPr lang="en-US" dirty="0"/>
+                        <a:t>28.3</a:t>
+                      </a:r>
+                    </a:p>
+                  </a:txBody>
+                  <a:tcPr/>
+                </a:tc>
+                <a:tc>
+                  <a:txBody>
+                    <a:bodyPr/>
+                    <a:lstStyle/>
+                    <a:p>
+                      <a:r>
+                        <a:rPr lang="en-US" dirty="0"/>
+                        <a:t>0.39</a:t>
+                      </a:r>
+                    </a:p>
+                  </a:txBody>
+                  <a:tcPr/>
+                </a:tc>
+                <a:extLst>
+                  <a:ext uri="{0D108BD9-81ED-4DB2-BD59-A6C34878D82A}">
+                    <a16:rowId xmlns:a16="http://schemas.microsoft.com/office/drawing/2014/main" val="1475590942"/>
+                  </a:ext>
+                </a:extLst>
+              </a:tr>
+              <a:tr h="370840">
+                <a:tc>
+                  <a:txBody>
+                    <a:bodyPr/>
+                    <a:lstStyle/>
+                    <a:p>
+                      <a:r>
+                        <a:rPr lang="en-US" dirty="0"/>
+                        <a:t>Blue </a:t>
+                      </a:r>
+                      <a:r>
+                        <a:rPr lang="en-US" dirty="0" err="1"/>
+                        <a:t>Runner_squid</a:t>
+                      </a:r>
+                      <a:endParaRPr lang="en-US" dirty="0"/>
+                    </a:p>
+                  </a:txBody>
+                  <a:tcPr/>
+                </a:tc>
+                <a:tc>
+                  <a:txBody>
+                    <a:bodyPr/>
+                    <a:lstStyle/>
+                    <a:p>
+                      <a:r>
+                        <a:rPr lang="en-US" dirty="0"/>
+                        <a:t>10</a:t>
+                      </a:r>
+                    </a:p>
+                  </a:txBody>
+                  <a:tcPr/>
+                </a:tc>
+                <a:tc>
+                  <a:txBody>
+                    <a:bodyPr/>
+                    <a:lstStyle/>
+                    <a:p>
+                      <a:r>
+                        <a:rPr lang="en-US" dirty="0"/>
+                        <a:t>20.6</a:t>
+                      </a:r>
+                    </a:p>
+                  </a:txBody>
+                  <a:tcPr/>
+                </a:tc>
+                <a:tc>
+                  <a:txBody>
+                    <a:bodyPr/>
+                    <a:lstStyle/>
+                    <a:p>
+                      <a:r>
+                        <a:rPr lang="en-US" dirty="0"/>
+                        <a:t>0.30</a:t>
+                      </a:r>
+                    </a:p>
+                  </a:txBody>
+                  <a:tcPr/>
+                </a:tc>
+                <a:extLst>
+                  <a:ext uri="{0D108BD9-81ED-4DB2-BD59-A6C34878D82A}">
+                    <a16:rowId xmlns:a16="http://schemas.microsoft.com/office/drawing/2014/main" val="2937677278"/>
+                  </a:ext>
+                </a:extLst>
+              </a:tr>
+            </a:tbl>
+          </a:graphicData>
+        </a:graphic>
+      </p:graphicFrame>
+    </p:spTree>
+    <p:extLst>
+      <p:ext uri="{BB962C8B-B14F-4D97-AF65-F5344CB8AC3E}">
+        <p14:creationId xmlns:p14="http://schemas.microsoft.com/office/powerpoint/2010/main" val="1201346765"/>
+      </p:ext>
+    </p:extLst>
+  </p:cSld>
+  <p:clrMapOvr>
+    <a:masterClrMapping/>
+  </p:clrMapOvr>
+</p:sld>
+</file>
+
+<file path=ppt/slides/slide8.xml><?xml version="1.0" encoding="utf-8"?>
+<p:sld xmlns:a="http://schemas.openxmlformats.org/drawingml/2006/main" xmlns:r="http://schemas.openxmlformats.org/officeDocument/2006/relationships" xmlns:p="http://schemas.openxmlformats.org/presentationml/2006/main">
+  <p:cSld>
+    <p:spTree>
+      <p:nvGrpSpPr>
+        <p:cNvPr id="1" name=""/>
+        <p:cNvGrpSpPr/>
+        <p:nvPr/>
+      </p:nvGrpSpPr>
+      <p:grpSpPr>
+        <a:xfrm>
+          <a:off x="0" y="0"/>
+          <a:ext cx="0" cy="0"/>
+          <a:chOff x="0" y="0"/>
+          <a:chExt cx="0" cy="0"/>
+        </a:xfrm>
+      </p:grpSpPr>
+      <p:sp>
+        <p:nvSpPr>
           <p:cNvPr id="2" name="TextBox 1">
             <a:extLst>
               <a:ext uri="{FF2B5EF4-FFF2-40B4-BE49-F238E27FC236}">

</xml_diff>

<commit_message>
Made minor changes to powerpoint
</commit_message>
<xml_diff>
--- a/Carcharnid_Analysis_Presentation.pptx
+++ b/Carcharnid_Analysis_Presentation.pptx
@@ -13,6 +13,7 @@
     <p:sldId id="261" r:id="rId7"/>
     <p:sldId id="264" r:id="rId8"/>
     <p:sldId id="263" r:id="rId9"/>
+    <p:sldId id="265" r:id="rId10"/>
   </p:sldIdLst>
   <p:sldSz cx="12192000" cy="6858000"/>
   <p:notesSz cx="6858000" cy="9144000"/>
@@ -4174,7 +4175,7 @@
           <a:p>
             <a:fld id="{527C9FF8-FC04-4E80-868F-D056BAA840C6}" type="datetimeFigureOut">
               <a:rPr lang="en-US" smtClean="0"/>
-              <a:t>11/9/2020</a:t>
+              <a:t>11/10/2020</a:t>
             </a:fld>
             <a:endParaRPr lang="en-US"/>
           </a:p>
@@ -4372,7 +4373,7 @@
           <a:p>
             <a:fld id="{527C9FF8-FC04-4E80-868F-D056BAA840C6}" type="datetimeFigureOut">
               <a:rPr lang="en-US" smtClean="0"/>
-              <a:t>11/9/2020</a:t>
+              <a:t>11/10/2020</a:t>
             </a:fld>
             <a:endParaRPr lang="en-US"/>
           </a:p>
@@ -4580,7 +4581,7 @@
           <a:p>
             <a:fld id="{527C9FF8-FC04-4E80-868F-D056BAA840C6}" type="datetimeFigureOut">
               <a:rPr lang="en-US" smtClean="0"/>
-              <a:t>11/9/2020</a:t>
+              <a:t>11/10/2020</a:t>
             </a:fld>
             <a:endParaRPr lang="en-US"/>
           </a:p>
@@ -4778,7 +4779,7 @@
           <a:p>
             <a:fld id="{527C9FF8-FC04-4E80-868F-D056BAA840C6}" type="datetimeFigureOut">
               <a:rPr lang="en-US" smtClean="0"/>
-              <a:t>11/9/2020</a:t>
+              <a:t>11/10/2020</a:t>
             </a:fld>
             <a:endParaRPr lang="en-US"/>
           </a:p>
@@ -5053,7 +5054,7 @@
           <a:p>
             <a:fld id="{527C9FF8-FC04-4E80-868F-D056BAA840C6}" type="datetimeFigureOut">
               <a:rPr lang="en-US" smtClean="0"/>
-              <a:t>11/9/2020</a:t>
+              <a:t>11/10/2020</a:t>
             </a:fld>
             <a:endParaRPr lang="en-US"/>
           </a:p>
@@ -5318,7 +5319,7 @@
           <a:p>
             <a:fld id="{527C9FF8-FC04-4E80-868F-D056BAA840C6}" type="datetimeFigureOut">
               <a:rPr lang="en-US" smtClean="0"/>
-              <a:t>11/9/2020</a:t>
+              <a:t>11/10/2020</a:t>
             </a:fld>
             <a:endParaRPr lang="en-US"/>
           </a:p>
@@ -5730,7 +5731,7 @@
           <a:p>
             <a:fld id="{527C9FF8-FC04-4E80-868F-D056BAA840C6}" type="datetimeFigureOut">
               <a:rPr lang="en-US" smtClean="0"/>
-              <a:t>11/9/2020</a:t>
+              <a:t>11/10/2020</a:t>
             </a:fld>
             <a:endParaRPr lang="en-US"/>
           </a:p>
@@ -5871,7 +5872,7 @@
           <a:p>
             <a:fld id="{527C9FF8-FC04-4E80-868F-D056BAA840C6}" type="datetimeFigureOut">
               <a:rPr lang="en-US" smtClean="0"/>
-              <a:t>11/9/2020</a:t>
+              <a:t>11/10/2020</a:t>
             </a:fld>
             <a:endParaRPr lang="en-US"/>
           </a:p>
@@ -5984,7 +5985,7 @@
           <a:p>
             <a:fld id="{527C9FF8-FC04-4E80-868F-D056BAA840C6}" type="datetimeFigureOut">
               <a:rPr lang="en-US" smtClean="0"/>
-              <a:t>11/9/2020</a:t>
+              <a:t>11/10/2020</a:t>
             </a:fld>
             <a:endParaRPr lang="en-US"/>
           </a:p>
@@ -6295,7 +6296,7 @@
           <a:p>
             <a:fld id="{527C9FF8-FC04-4E80-868F-D056BAA840C6}" type="datetimeFigureOut">
               <a:rPr lang="en-US" smtClean="0"/>
-              <a:t>11/9/2020</a:t>
+              <a:t>11/10/2020</a:t>
             </a:fld>
             <a:endParaRPr lang="en-US"/>
           </a:p>
@@ -6583,7 +6584,7 @@
           <a:p>
             <a:fld id="{527C9FF8-FC04-4E80-868F-D056BAA840C6}" type="datetimeFigureOut">
               <a:rPr lang="en-US" smtClean="0"/>
-              <a:t>11/9/2020</a:t>
+              <a:t>11/10/2020</a:t>
             </a:fld>
             <a:endParaRPr lang="en-US"/>
           </a:p>
@@ -6824,7 +6825,7 @@
           <a:p>
             <a:fld id="{527C9FF8-FC04-4E80-868F-D056BAA840C6}" type="datetimeFigureOut">
               <a:rPr lang="en-US" smtClean="0"/>
-              <a:t>11/9/2020</a:t>
+              <a:t>11/10/2020</a:t>
             </a:fld>
             <a:endParaRPr lang="en-US"/>
           </a:p>
@@ -9864,6 +9865,96 @@
 </p:sld>
 </file>
 
+<file path=ppt/slides/slide9.xml><?xml version="1.0" encoding="utf-8"?>
+<p:sld xmlns:a="http://schemas.openxmlformats.org/drawingml/2006/main" xmlns:r="http://schemas.openxmlformats.org/officeDocument/2006/relationships" xmlns:p="http://schemas.openxmlformats.org/presentationml/2006/main">
+  <p:cSld>
+    <p:spTree>
+      <p:nvGrpSpPr>
+        <p:cNvPr id="1" name=""/>
+        <p:cNvGrpSpPr/>
+        <p:nvPr/>
+      </p:nvGrpSpPr>
+      <p:grpSpPr>
+        <a:xfrm>
+          <a:off x="0" y="0"/>
+          <a:ext cx="0" cy="0"/>
+          <a:chOff x="0" y="0"/>
+          <a:chExt cx="0" cy="0"/>
+        </a:xfrm>
+      </p:grpSpPr>
+      <p:pic>
+        <p:nvPicPr>
+          <p:cNvPr id="2" name="Picture 1">
+            <a:extLst>
+              <a:ext uri="{FF2B5EF4-FFF2-40B4-BE49-F238E27FC236}">
+                <a16:creationId xmlns:a16="http://schemas.microsoft.com/office/drawing/2014/main" id="{1991E5C0-32A3-4A22-93A6-9AD24A28D02B}"/>
+              </a:ext>
+            </a:extLst>
+          </p:cNvPr>
+          <p:cNvPicPr>
+            <a:picLocks noChangeAspect="1"/>
+          </p:cNvPicPr>
+          <p:nvPr/>
+        </p:nvPicPr>
+        <p:blipFill>
+          <a:blip r:embed="rId2"/>
+          <a:stretch>
+            <a:fillRect/>
+          </a:stretch>
+        </p:blipFill>
+        <p:spPr>
+          <a:xfrm>
+            <a:off x="2336256" y="939567"/>
+            <a:ext cx="7519488" cy="2215043"/>
+          </a:xfrm>
+          <a:prstGeom prst="rect">
+            <a:avLst/>
+          </a:prstGeom>
+        </p:spPr>
+      </p:pic>
+      <p:pic>
+        <p:nvPicPr>
+          <p:cNvPr id="3" name="Picture 2">
+            <a:extLst>
+              <a:ext uri="{FF2B5EF4-FFF2-40B4-BE49-F238E27FC236}">
+                <a16:creationId xmlns:a16="http://schemas.microsoft.com/office/drawing/2014/main" id="{187FD87B-D88C-4E11-8359-5056B7C894B6}"/>
+              </a:ext>
+            </a:extLst>
+          </p:cNvPr>
+          <p:cNvPicPr>
+            <a:picLocks noChangeAspect="1"/>
+          </p:cNvPicPr>
+          <p:nvPr/>
+        </p:nvPicPr>
+        <p:blipFill>
+          <a:blip r:embed="rId3"/>
+          <a:stretch>
+            <a:fillRect/>
+          </a:stretch>
+        </p:blipFill>
+        <p:spPr>
+          <a:xfrm>
+            <a:off x="2784593" y="3854393"/>
+            <a:ext cx="6622814" cy="1985611"/>
+          </a:xfrm>
+          <a:prstGeom prst="rect">
+            <a:avLst/>
+          </a:prstGeom>
+        </p:spPr>
+      </p:pic>
+    </p:spTree>
+    <p:extLst>
+      <p:ext uri="{BB962C8B-B14F-4D97-AF65-F5344CB8AC3E}">
+        <p14:creationId xmlns:p14="http://schemas.microsoft.com/office/powerpoint/2010/main" val="1483727654"/>
+      </p:ext>
+    </p:extLst>
+  </p:cSld>
+  <p:clrMapOvr>
+    <a:masterClrMapping/>
+  </p:clrMapOvr>
+</p:sld>
+</file>
+
 <file path=ppt/theme/theme1.xml><?xml version="1.0" encoding="utf-8"?>
 <a:theme xmlns:a="http://schemas.openxmlformats.org/drawingml/2006/main" name="Office Theme">
   <a:themeElements>

</xml_diff>

<commit_message>
Last commit for PowerPoint
</commit_message>
<xml_diff>
--- a/Carcharnid_Analysis_Presentation.pptx
+++ b/Carcharnid_Analysis_Presentation.pptx
@@ -168,7 +168,7 @@
               <a:rPr lang="en-US" sz="2400" b="1" dirty="0">
                 <a:latin typeface="Avenir Next LT Pro" panose="020B0504020202020204" pitchFamily="34" charset="0"/>
               </a:rPr>
-              <a:t>Counts</a:t>
+              <a:t>Counts (Days)</a:t>
             </a:r>
             <a:r>
               <a:rPr lang="en-US" sz="2400" b="1" baseline="0" dirty="0">
@@ -8003,7 +8003,7 @@
           <p:nvPr>
             <p:extLst>
               <p:ext uri="{D42A27DB-BD31-4B8C-83A1-F6EECF244321}">
-                <p14:modId xmlns:p14="http://schemas.microsoft.com/office/powerpoint/2010/main" val="3484415665"/>
+                <p14:modId xmlns:p14="http://schemas.microsoft.com/office/powerpoint/2010/main" val="4215265423"/>
               </p:ext>
             </p:extLst>
           </p:nvPr>

</xml_diff>